<commit_message>
Changed values in "Präsentation" and "Projekthandbuch"
Changed costs in "Präsentation" and changed
and some values in "Proojekthandbuch"
</commit_message>
<xml_diff>
--- a/08_Präsentation/Projekt Präsentation(07.10.2019).pptx
+++ b/08_Präsentation/Projekt Präsentation(07.10.2019).pptx
@@ -116,6 +116,11 @@
       </a:defRPr>
     </a:lvl9pPr>
   </p:defaultTextStyle>
+  <p:extLst>
+    <p:ext uri="{EFAFB233-063F-42B5-8137-9DF3F51BA10A}">
+      <p15:sldGuideLst xmlns:p15="http://schemas.microsoft.com/office/powerpoint/2012/main"/>
+    </p:ext>
+  </p:extLst>
 </p:presentation>
 </file>
 
@@ -129,6 +134,30 @@
 
 <file path=ppt/changesInfos/changesInfo1.xml><?xml version="1.0" encoding="utf-8"?>
 <pc:chgInfo xmlns:a="http://schemas.openxmlformats.org/drawingml/2006/main" xmlns:r="http://schemas.openxmlformats.org/officeDocument/2006/relationships" xmlns:ac="http://schemas.microsoft.com/office/drawing/2013/main/command" xmlns:pc="http://schemas.microsoft.com/office/powerpoint/2013/main/command">
+  <pc:docChgLst>
+    <pc:chgData name="Tobias Schrottwieser" userId="023deaa1-c393-4577-b839-72b4ea2642d3" providerId="ADAL" clId="{77D5614B-5071-4584-92AB-CFA0E7AF617C}"/>
+    <pc:docChg chg="modSld">
+      <pc:chgData name="Tobias Schrottwieser" userId="023deaa1-c393-4577-b839-72b4ea2642d3" providerId="ADAL" clId="{77D5614B-5071-4584-92AB-CFA0E7AF617C}" dt="2019-10-09T13:05:26.712" v="168" actId="20577"/>
+      <pc:docMkLst>
+        <pc:docMk/>
+      </pc:docMkLst>
+      <pc:sldChg chg="modSp">
+        <pc:chgData name="Tobias Schrottwieser" userId="023deaa1-c393-4577-b839-72b4ea2642d3" providerId="ADAL" clId="{77D5614B-5071-4584-92AB-CFA0E7AF617C}" dt="2019-10-09T13:05:26.712" v="168" actId="20577"/>
+        <pc:sldMkLst>
+          <pc:docMk/>
+          <pc:sldMk cId="2905441756" sldId="263"/>
+        </pc:sldMkLst>
+        <pc:graphicFrameChg chg="modGraphic">
+          <ac:chgData name="Tobias Schrottwieser" userId="023deaa1-c393-4577-b839-72b4ea2642d3" providerId="ADAL" clId="{77D5614B-5071-4584-92AB-CFA0E7AF617C}" dt="2019-10-09T13:05:26.712" v="168" actId="20577"/>
+          <ac:graphicFrameMkLst>
+            <pc:docMk/>
+            <pc:sldMk cId="2905441756" sldId="263"/>
+            <ac:graphicFrameMk id="6" creationId="{EF804AD4-2197-4C90-A19C-0DF6CB977C24}"/>
+          </ac:graphicFrameMkLst>
+        </pc:graphicFrameChg>
+      </pc:sldChg>
+    </pc:docChg>
+  </pc:docChgLst>
   <pc:docChgLst>
     <pc:chgData name="Schrottwieser Tobias" userId="023deaa1-c393-4577-b839-72b4ea2642d3" providerId="ADAL" clId="{77D5614B-5071-4584-92AB-CFA0E7AF617C}"/>
     <pc:docChg chg="modSld">
@@ -301,7 +330,7 @@
           <a:p>
             <a:fld id="{FCBEB2C5-5AA4-45E9-BF8A-296FBFEDD6AB}" type="datetimeFigureOut">
               <a:rPr lang="de-DE" smtClean="0"/>
-              <a:t>07.10.2019</a:t>
+              <a:t>09.10.2019</a:t>
             </a:fld>
             <a:endParaRPr lang="de-DE"/>
           </a:p>
@@ -812,7 +841,7 @@
           <a:p>
             <a:fld id="{48A87A34-81AB-432B-8DAE-1953F412C126}" type="datetimeFigureOut">
               <a:rPr lang="en-US" dirty="0"/>
-              <a:t>10/7/2019</a:t>
+              <a:t>10/9/2019</a:t>
             </a:fld>
             <a:endParaRPr lang="en-US" dirty="0"/>
           </a:p>
@@ -987,7 +1016,7 @@
           <a:p>
             <a:fld id="{48A87A34-81AB-432B-8DAE-1953F412C126}" type="datetimeFigureOut">
               <a:rPr lang="en-US" dirty="0"/>
-              <a:t>10/7/2019</a:t>
+              <a:t>10/9/2019</a:t>
             </a:fld>
             <a:endParaRPr lang="en-US" dirty="0"/>
           </a:p>
@@ -1166,7 +1195,7 @@
           <a:p>
             <a:fld id="{48A87A34-81AB-432B-8DAE-1953F412C126}" type="datetimeFigureOut">
               <a:rPr lang="en-US" dirty="0"/>
-              <a:t>10/7/2019</a:t>
+              <a:t>10/9/2019</a:t>
             </a:fld>
             <a:endParaRPr lang="en-US" dirty="0"/>
           </a:p>
@@ -1331,7 +1360,7 @@
           <a:p>
             <a:fld id="{48A87A34-81AB-432B-8DAE-1953F412C126}" type="datetimeFigureOut">
               <a:rPr lang="en-US" dirty="0"/>
-              <a:t>10/7/2019</a:t>
+              <a:t>10/9/2019</a:t>
             </a:fld>
             <a:endParaRPr lang="en-US" dirty="0"/>
           </a:p>
@@ -1574,7 +1603,7 @@
           <a:p>
             <a:fld id="{48A87A34-81AB-432B-8DAE-1953F412C126}" type="datetimeFigureOut">
               <a:rPr lang="en-US" dirty="0"/>
-              <a:t>10/7/2019</a:t>
+              <a:t>10/9/2019</a:t>
             </a:fld>
             <a:endParaRPr lang="en-US" dirty="0"/>
           </a:p>
@@ -1806,7 +1835,7 @@
           <a:p>
             <a:fld id="{48A87A34-81AB-432B-8DAE-1953F412C126}" type="datetimeFigureOut">
               <a:rPr lang="en-US" dirty="0"/>
-              <a:t>10/7/2019</a:t>
+              <a:t>10/9/2019</a:t>
             </a:fld>
             <a:endParaRPr lang="en-US" dirty="0"/>
           </a:p>
@@ -2186,7 +2215,7 @@
           <a:p>
             <a:fld id="{48A87A34-81AB-432B-8DAE-1953F412C126}" type="datetimeFigureOut">
               <a:rPr lang="en-US" dirty="0"/>
-              <a:t>10/7/2019</a:t>
+              <a:t>10/9/2019</a:t>
             </a:fld>
             <a:endParaRPr lang="en-US" dirty="0"/>
           </a:p>
@@ -2299,7 +2328,7 @@
           <a:p>
             <a:fld id="{48A87A34-81AB-432B-8DAE-1953F412C126}" type="datetimeFigureOut">
               <a:rPr lang="en-US" dirty="0"/>
-              <a:t>10/7/2019</a:t>
+              <a:t>10/9/2019</a:t>
             </a:fld>
             <a:endParaRPr lang="en-US" dirty="0"/>
           </a:p>
@@ -2389,7 +2418,7 @@
           <a:p>
             <a:fld id="{48A87A34-81AB-432B-8DAE-1953F412C126}" type="datetimeFigureOut">
               <a:rPr lang="en-US" dirty="0"/>
-              <a:t>10/7/2019</a:t>
+              <a:t>10/9/2019</a:t>
             </a:fld>
             <a:endParaRPr lang="en-US" dirty="0"/>
           </a:p>
@@ -2635,7 +2664,7 @@
           <a:p>
             <a:fld id="{48A87A34-81AB-432B-8DAE-1953F412C126}" type="datetimeFigureOut">
               <a:rPr lang="en-US" dirty="0"/>
-              <a:t>10/7/2019</a:t>
+              <a:t>10/9/2019</a:t>
             </a:fld>
             <a:endParaRPr lang="en-US" dirty="0"/>
           </a:p>
@@ -3022,7 +3051,7 @@
             <a:fld id="{48A87A34-81AB-432B-8DAE-1953F412C126}" type="datetimeFigureOut">
               <a:rPr lang="en-US" dirty="0"/>
               <a:pPr/>
-              <a:t>10/7/2019</a:t>
+              <a:t>10/9/2019</a:t>
             </a:fld>
             <a:endParaRPr lang="en-US" dirty="0"/>
           </a:p>
@@ -3236,7 +3265,7 @@
             <a:fld id="{48A87A34-81AB-432B-8DAE-1953F412C126}" type="datetimeFigureOut">
               <a:rPr lang="en-US" dirty="0"/>
               <a:pPr/>
-              <a:t>10/7/2019</a:t>
+              <a:t>10/9/2019</a:t>
             </a:fld>
             <a:endParaRPr lang="en-US" dirty="0"/>
           </a:p>
@@ -4117,13 +4146,13 @@
   <p:clrMapOvr>
     <a:masterClrMapping/>
   </p:clrMapOvr>
-  <mc:AlternateContent xmlns:mc="http://schemas.openxmlformats.org/markup-compatibility/2006">
-    <mc:Choice xmlns:p159="http://schemas.microsoft.com/office/powerpoint/2015/09/main" Requires="p159">
+  <mc:AlternateContent xmlns:mc="http://schemas.openxmlformats.org/markup-compatibility/2006" xmlns:p159="http://schemas.microsoft.com/office/powerpoint/2015/09/main">
+    <mc:Choice Requires="p159">
       <p:transition xmlns:p14="http://schemas.microsoft.com/office/powerpoint/2010/main" spd="slow" p14:dur="2000">
         <p159:morph option="byObject"/>
       </p:transition>
     </mc:Choice>
-    <mc:Fallback>
+    <mc:Fallback xmlns="">
       <p:transition spd="slow">
         <p:fade/>
       </p:transition>
@@ -4195,13 +4224,13 @@
   <p:clrMapOvr>
     <a:masterClrMapping/>
   </p:clrMapOvr>
-  <mc:AlternateContent xmlns:mc="http://schemas.openxmlformats.org/markup-compatibility/2006">
-    <mc:Choice xmlns:p159="http://schemas.microsoft.com/office/powerpoint/2015/09/main" Requires="p159">
+  <mc:AlternateContent xmlns:mc="http://schemas.openxmlformats.org/markup-compatibility/2006" xmlns:p159="http://schemas.microsoft.com/office/powerpoint/2015/09/main">
+    <mc:Choice Requires="p159">
       <p:transition xmlns:p14="http://schemas.microsoft.com/office/powerpoint/2010/main" spd="slow" p14:dur="2000">
         <p159:morph option="byObject"/>
       </p:transition>
     </mc:Choice>
-    <mc:Fallback>
+    <mc:Fallback xmlns="">
       <p:transition spd="slow">
         <p:fade/>
       </p:transition>
@@ -4362,13 +4391,13 @@
   <p:clrMapOvr>
     <a:masterClrMapping/>
   </p:clrMapOvr>
-  <mc:AlternateContent xmlns:mc="http://schemas.openxmlformats.org/markup-compatibility/2006">
-    <mc:Choice xmlns:p159="http://schemas.microsoft.com/office/powerpoint/2015/09/main" Requires="p159">
+  <mc:AlternateContent xmlns:mc="http://schemas.openxmlformats.org/markup-compatibility/2006" xmlns:p159="http://schemas.microsoft.com/office/powerpoint/2015/09/main">
+    <mc:Choice Requires="p159">
       <p:transition xmlns:p14="http://schemas.microsoft.com/office/powerpoint/2010/main" spd="slow" p14:dur="2000">
         <p159:morph option="byObject"/>
       </p:transition>
     </mc:Choice>
-    <mc:Fallback>
+    <mc:Fallback xmlns="">
       <p:transition spd="slow">
         <p:fade/>
       </p:transition>
@@ -4514,13 +4543,13 @@
   <p:clrMapOvr>
     <a:masterClrMapping/>
   </p:clrMapOvr>
-  <mc:AlternateContent xmlns:mc="http://schemas.openxmlformats.org/markup-compatibility/2006">
-    <mc:Choice xmlns:p159="http://schemas.microsoft.com/office/powerpoint/2015/09/main" Requires="p159">
+  <mc:AlternateContent xmlns:mc="http://schemas.openxmlformats.org/markup-compatibility/2006" xmlns:p159="http://schemas.microsoft.com/office/powerpoint/2015/09/main">
+    <mc:Choice Requires="p159">
       <p:transition xmlns:p14="http://schemas.microsoft.com/office/powerpoint/2010/main" spd="slow" p14:dur="2000">
         <p159:morph option="byObject"/>
       </p:transition>
     </mc:Choice>
-    <mc:Fallback>
+    <mc:Fallback xmlns="">
       <p:transition spd="slow">
         <p:fade/>
       </p:transition>
@@ -4636,13 +4665,13 @@
   <p:clrMapOvr>
     <a:masterClrMapping/>
   </p:clrMapOvr>
-  <mc:AlternateContent xmlns:mc="http://schemas.openxmlformats.org/markup-compatibility/2006">
-    <mc:Choice xmlns:p159="http://schemas.microsoft.com/office/powerpoint/2015/09/main" Requires="p159">
+  <mc:AlternateContent xmlns:mc="http://schemas.openxmlformats.org/markup-compatibility/2006" xmlns:p159="http://schemas.microsoft.com/office/powerpoint/2015/09/main">
+    <mc:Choice Requires="p159">
       <p:transition xmlns:p14="http://schemas.microsoft.com/office/powerpoint/2010/main" spd="slow" p14:dur="2000">
         <p159:morph option="byObject"/>
       </p:transition>
     </mc:Choice>
-    <mc:Fallback>
+    <mc:Fallback xmlns="">
       <p:transition spd="slow">
         <p:fade/>
       </p:transition>
@@ -4699,8 +4728,8 @@
           </a:p>
         </p:txBody>
       </p:sp>
-      <mc:AlternateContent xmlns:mc="http://schemas.openxmlformats.org/markup-compatibility/2006">
-        <mc:Choice xmlns:a14="http://schemas.microsoft.com/office/drawing/2010/main" Requires="a14">
+      <mc:AlternateContent xmlns:mc="http://schemas.openxmlformats.org/markup-compatibility/2006" xmlns:a14="http://schemas.microsoft.com/office/drawing/2010/main">
+        <mc:Choice Requires="a14">
           <p:sp>
             <p:nvSpPr>
               <p:cNvPr id="3" name="Inhaltsplatzhalter 2">
@@ -4734,7 +4763,7 @@
                     <m:sSup>
                       <m:sSupPr>
                         <m:ctrlPr>
-                          <a:rPr lang="de-DE" smtClean="0">
+                          <a:rPr lang="de-DE" i="1" smtClean="0">
                             <a:latin typeface="Cambria Math" panose="02040503050406030204" pitchFamily="18" charset="0"/>
                           </a:rPr>
                         </m:ctrlPr>
@@ -4844,7 +4873,7 @@
             </p:txBody>
           </p:sp>
         </mc:Choice>
-        <mc:Fallback>
+        <mc:Fallback xmlns="">
           <p:sp>
             <p:nvSpPr>
               <p:cNvPr id="3" name="Inhaltsplatzhalter 2">
@@ -4894,13 +4923,13 @@
   <p:clrMapOvr>
     <a:masterClrMapping/>
   </p:clrMapOvr>
-  <mc:AlternateContent xmlns:mc="http://schemas.openxmlformats.org/markup-compatibility/2006">
-    <mc:Choice xmlns:p159="http://schemas.microsoft.com/office/powerpoint/2015/09/main" Requires="p159">
+  <mc:AlternateContent xmlns:mc="http://schemas.openxmlformats.org/markup-compatibility/2006" xmlns:p159="http://schemas.microsoft.com/office/powerpoint/2015/09/main">
+    <mc:Choice Requires="p159">
       <p:transition xmlns:p14="http://schemas.microsoft.com/office/powerpoint/2010/main" spd="slow" p14:dur="2000">
         <p159:morph option="byObject"/>
       </p:transition>
     </mc:Choice>
-    <mc:Fallback>
+    <mc:Fallback xmlns="">
       <p:transition spd="slow">
         <p:fade/>
       </p:transition>
@@ -5040,13 +5069,13 @@
   <p:clrMapOvr>
     <a:masterClrMapping/>
   </p:clrMapOvr>
-  <mc:AlternateContent xmlns:mc="http://schemas.openxmlformats.org/markup-compatibility/2006">
-    <mc:Choice xmlns:p159="http://schemas.microsoft.com/office/powerpoint/2015/09/main" Requires="p159">
+  <mc:AlternateContent xmlns:mc="http://schemas.openxmlformats.org/markup-compatibility/2006" xmlns:p159="http://schemas.microsoft.com/office/powerpoint/2015/09/main">
+    <mc:Choice Requires="p159">
       <p:transition xmlns:p14="http://schemas.microsoft.com/office/powerpoint/2010/main" spd="slow" p14:dur="2000">
         <p159:morph option="byObject"/>
       </p:transition>
     </mc:Choice>
-    <mc:Fallback>
+    <mc:Fallback xmlns="">
       <p:transition spd="slow">
         <p:fade/>
       </p:transition>
@@ -5195,13 +5224,13 @@
   <p:clrMapOvr>
     <a:masterClrMapping/>
   </p:clrMapOvr>
-  <mc:AlternateContent xmlns:mc="http://schemas.openxmlformats.org/markup-compatibility/2006">
-    <mc:Choice xmlns:p159="http://schemas.microsoft.com/office/powerpoint/2015/09/main" Requires="p159">
+  <mc:AlternateContent xmlns:mc="http://schemas.openxmlformats.org/markup-compatibility/2006" xmlns:p159="http://schemas.microsoft.com/office/powerpoint/2015/09/main">
+    <mc:Choice Requires="p159">
       <p:transition xmlns:p14="http://schemas.microsoft.com/office/powerpoint/2010/main" spd="slow" p14:dur="2000">
         <p159:morph option="byObject"/>
       </p:transition>
     </mc:Choice>
-    <mc:Fallback>
+    <mc:Fallback xmlns="">
       <p:transition spd="slow">
         <p:fade/>
       </p:transition>
@@ -5270,7 +5299,7 @@
           <p:nvPr>
             <p:extLst>
               <p:ext uri="{D42A27DB-BD31-4B8C-83A1-F6EECF244321}">
-                <p14:modId xmlns:p14="http://schemas.microsoft.com/office/powerpoint/2010/main" val="3729085177"/>
+                <p14:modId xmlns:p14="http://schemas.microsoft.com/office/powerpoint/2010/main" val="668803574"/>
               </p:ext>
             </p:extLst>
           </p:nvPr>
@@ -5394,7 +5423,7 @@
                           <a:latin typeface="Arial" panose="020B0604020202020204" pitchFamily="34" charset="0"/>
                           <a:cs typeface="Arial" panose="020B0604020202020204" pitchFamily="34" charset="0"/>
                         </a:rPr>
-                        <a:t>Projektstart erfolgt</a:t>
+                        <a:t>Projektstart</a:t>
                       </a:r>
                     </a:p>
                   </a:txBody>
@@ -5468,7 +5497,7 @@
                           <a:latin typeface="Arial" panose="020B0604020202020204" pitchFamily="34" charset="0"/>
                           <a:cs typeface="Arial" panose="020B0604020202020204" pitchFamily="34" charset="0"/>
                         </a:rPr>
-                        <a:t>Softwareentwicklung</a:t>
+                        <a:t>Grobentwicklung</a:t>
                       </a:r>
                     </a:p>
                   </a:txBody>
@@ -5485,7 +5514,7 @@
                           <a:latin typeface="Arial" panose="020B0604020202020204" pitchFamily="34" charset="0"/>
                           <a:cs typeface="Arial" panose="020B0604020202020204" pitchFamily="34" charset="0"/>
                         </a:rPr>
-                        <a:t>60</a:t>
+                        <a:t>50</a:t>
                       </a:r>
                     </a:p>
                   </a:txBody>
@@ -5542,7 +5571,7 @@
                           <a:latin typeface="Arial" panose="020B0604020202020204" pitchFamily="34" charset="0"/>
                           <a:cs typeface="Arial" panose="020B0604020202020204" pitchFamily="34" charset="0"/>
                         </a:rPr>
-                        <a:t>Implementierung</a:t>
+                        <a:t>Feinentwicklung</a:t>
                       </a:r>
                     </a:p>
                   </a:txBody>
@@ -5559,8 +5588,19 @@
                           <a:latin typeface="Arial" panose="020B0604020202020204" pitchFamily="34" charset="0"/>
                           <a:cs typeface="Arial" panose="020B0604020202020204" pitchFamily="34" charset="0"/>
                         </a:rPr>
-                        <a:t>10</a:t>
+                        <a:t>2</a:t>
                       </a:r>
+                      <a:r>
+                        <a:rPr lang="de-DE">
+                          <a:latin typeface="Arial" panose="020B0604020202020204" pitchFamily="34" charset="0"/>
+                          <a:cs typeface="Arial" panose="020B0604020202020204" pitchFamily="34" charset="0"/>
+                        </a:rPr>
+                        <a:t>0</a:t>
+                      </a:r>
+                      <a:endParaRPr lang="de-DE" dirty="0">
+                        <a:latin typeface="Arial" panose="020B0604020202020204" pitchFamily="34" charset="0"/>
+                        <a:cs typeface="Arial" panose="020B0604020202020204" pitchFamily="34" charset="0"/>
+                      </a:endParaRPr>
                     </a:p>
                   </a:txBody>
                   <a:tcPr/>
@@ -5616,7 +5656,7 @@
                           <a:latin typeface="Arial" panose="020B0604020202020204" pitchFamily="34" charset="0"/>
                           <a:cs typeface="Arial" panose="020B0604020202020204" pitchFamily="34" charset="0"/>
                         </a:rPr>
-                        <a:t>Testing</a:t>
+                        <a:t>Troubleshooting</a:t>
                       </a:r>
                     </a:p>
                   </a:txBody>
@@ -5633,7 +5673,7 @@
                           <a:latin typeface="Arial" panose="020B0604020202020204" pitchFamily="34" charset="0"/>
                           <a:cs typeface="Arial" panose="020B0604020202020204" pitchFamily="34" charset="0"/>
                         </a:rPr>
-                        <a:t>10</a:t>
+                        <a:t>40</a:t>
                       </a:r>
                     </a:p>
                   </a:txBody>
@@ -5690,7 +5730,7 @@
                           <a:latin typeface="Arial" panose="020B0604020202020204" pitchFamily="34" charset="0"/>
                           <a:cs typeface="Arial" panose="020B0604020202020204" pitchFamily="34" charset="0"/>
                         </a:rPr>
-                        <a:t>Debuggen</a:t>
+                        <a:t>Projektende</a:t>
                       </a:r>
                     </a:p>
                   </a:txBody>
@@ -5707,7 +5747,7 @@
                           <a:latin typeface="Arial" panose="020B0604020202020204" pitchFamily="34" charset="0"/>
                           <a:cs typeface="Arial" panose="020B0604020202020204" pitchFamily="34" charset="0"/>
                         </a:rPr>
-                        <a:t>40</a:t>
+                        <a:t>15</a:t>
                       </a:r>
                     </a:p>
                   </a:txBody>
@@ -5787,7 +5827,7 @@
                           <a:latin typeface="Arial" panose="020B0604020202020204" pitchFamily="34" charset="0"/>
                           <a:cs typeface="Arial" panose="020B0604020202020204" pitchFamily="34" charset="0"/>
                         </a:rPr>
-                        <a:t>160</a:t>
+                        <a:t>165</a:t>
                       </a:r>
                     </a:p>
                   </a:txBody>
@@ -5865,13 +5905,13 @@
   <p:clrMapOvr>
     <a:masterClrMapping/>
   </p:clrMapOvr>
-  <mc:AlternateContent xmlns:mc="http://schemas.openxmlformats.org/markup-compatibility/2006">
-    <mc:Choice xmlns:p159="http://schemas.microsoft.com/office/powerpoint/2015/09/main" Requires="p159">
+  <mc:AlternateContent xmlns:mc="http://schemas.openxmlformats.org/markup-compatibility/2006" xmlns:p159="http://schemas.microsoft.com/office/powerpoint/2015/09/main">
+    <mc:Choice Requires="p159">
       <p:transition xmlns:p14="http://schemas.microsoft.com/office/powerpoint/2010/main" spd="slow" p14:dur="2000">
         <p159:morph option="byObject"/>
       </p:transition>
     </mc:Choice>
-    <mc:Fallback>
+    <mc:Fallback xmlns="">
       <p:transition spd="slow">
         <p:fade/>
       </p:transition>
@@ -6011,13 +6051,13 @@
   <p:clrMapOvr>
     <a:masterClrMapping/>
   </p:clrMapOvr>
-  <mc:AlternateContent xmlns:mc="http://schemas.openxmlformats.org/markup-compatibility/2006">
-    <mc:Choice xmlns:p159="http://schemas.microsoft.com/office/powerpoint/2015/09/main" Requires="p159">
+  <mc:AlternateContent xmlns:mc="http://schemas.openxmlformats.org/markup-compatibility/2006" xmlns:p159="http://schemas.microsoft.com/office/powerpoint/2015/09/main">
+    <mc:Choice Requires="p159">
       <p:transition xmlns:p14="http://schemas.microsoft.com/office/powerpoint/2010/main" spd="slow" p14:dur="2000">
         <p159:morph option="byObject"/>
       </p:transition>
     </mc:Choice>
-    <mc:Fallback>
+    <mc:Fallback xmlns="">
       <p:transition spd="slow">
         <p:fade/>
       </p:transition>
@@ -6745,18 +6785,18 @@
 </file>
 
 <file path=customXml/item2.xml><?xml version="1.0" encoding="utf-8"?>
+<p:properties xmlns:p="http://schemas.microsoft.com/office/2006/metadata/properties" xmlns:xsi="http://www.w3.org/2001/XMLSchema-instance" xmlns:pc="http://schemas.microsoft.com/office/infopath/2007/PartnerControls">
+  <documentManagement/>
+</p:properties>
+</file>
+
+<file path=customXml/item3.xml><?xml version="1.0" encoding="utf-8"?>
 <?mso-contentType ?>
 <FormTemplates xmlns="http://schemas.microsoft.com/sharepoint/v3/contenttype/forms">
   <Display>DocumentLibraryForm</Display>
   <Edit>DocumentLibraryForm</Edit>
   <New>DocumentLibraryForm</New>
 </FormTemplates>
-</file>
-
-<file path=customXml/item3.xml><?xml version="1.0" encoding="utf-8"?>
-<p:properties xmlns:p="http://schemas.microsoft.com/office/2006/metadata/properties" xmlns:xsi="http://www.w3.org/2001/XMLSchema-instance" xmlns:pc="http://schemas.microsoft.com/office/infopath/2007/PartnerControls">
-  <documentManagement/>
-</p:properties>
 </file>
 
 <file path=customXml/itemProps1.xml><?xml version="1.0" encoding="utf-8"?>
@@ -6778,18 +6818,18 @@
 </file>
 
 <file path=customXml/itemProps2.xml><?xml version="1.0" encoding="utf-8"?>
-<ds:datastoreItem xmlns:ds="http://schemas.openxmlformats.org/officeDocument/2006/customXml" ds:itemID="{703D70BE-6769-44A8-BEFF-67F10EC2FF99}">
-  <ds:schemaRefs>
-    <ds:schemaRef ds:uri="http://schemas.microsoft.com/sharepoint/v3/contenttype/forms"/>
-  </ds:schemaRefs>
-</ds:datastoreItem>
-</file>
-
-<file path=customXml/itemProps3.xml><?xml version="1.0" encoding="utf-8"?>
 <ds:datastoreItem xmlns:ds="http://schemas.openxmlformats.org/officeDocument/2006/customXml" ds:itemID="{077774E8-F775-4602-B1E0-1FE6C8DEEA49}">
   <ds:schemaRefs>
     <ds:schemaRef ds:uri="http://schemas.microsoft.com/office/2006/metadata/properties"/>
     <ds:schemaRef ds:uri="http://schemas.microsoft.com/office/infopath/2007/PartnerControls"/>
   </ds:schemaRefs>
 </ds:datastoreItem>
+</file>
+
+<file path=customXml/itemProps3.xml><?xml version="1.0" encoding="utf-8"?>
+<ds:datastoreItem xmlns:ds="http://schemas.openxmlformats.org/officeDocument/2006/customXml" ds:itemID="{703D70BE-6769-44A8-BEFF-67F10EC2FF99}">
+  <ds:schemaRefs>
+    <ds:schemaRef ds:uri="http://schemas.microsoft.com/sharepoint/v3/contenttype/forms"/>
+  </ds:schemaRefs>
+</ds:datastoreItem>
 </file>
</xml_diff>

<commit_message>
Titelfolie - Namen um 5mm verschoben.
</commit_message>
<xml_diff>
--- a/08_Präsentation/Projekt Präsentation(07.10.2019).pptx
+++ b/08_Präsentation/Projekt Präsentation(07.10.2019).pptx
@@ -3905,8 +3905,8 @@
         </p:nvSpPr>
         <p:spPr>
           <a:xfrm>
-            <a:off x="0" y="5880379"/>
-            <a:ext cx="12192000" cy="977621"/>
+            <a:off x="0" y="5798915"/>
+            <a:ext cx="12192000" cy="1059085"/>
           </a:xfrm>
           <a:prstGeom prst="rect">
             <a:avLst/>
@@ -6785,18 +6785,18 @@
 </file>
 
 <file path=customXml/item2.xml><?xml version="1.0" encoding="utf-8"?>
-<p:properties xmlns:p="http://schemas.microsoft.com/office/2006/metadata/properties" xmlns:xsi="http://www.w3.org/2001/XMLSchema-instance" xmlns:pc="http://schemas.microsoft.com/office/infopath/2007/PartnerControls">
-  <documentManagement/>
-</p:properties>
-</file>
-
-<file path=customXml/item3.xml><?xml version="1.0" encoding="utf-8"?>
 <?mso-contentType ?>
 <FormTemplates xmlns="http://schemas.microsoft.com/sharepoint/v3/contenttype/forms">
   <Display>DocumentLibraryForm</Display>
   <Edit>DocumentLibraryForm</Edit>
   <New>DocumentLibraryForm</New>
 </FormTemplates>
+</file>
+
+<file path=customXml/item3.xml><?xml version="1.0" encoding="utf-8"?>
+<p:properties xmlns:p="http://schemas.microsoft.com/office/2006/metadata/properties" xmlns:xsi="http://www.w3.org/2001/XMLSchema-instance" xmlns:pc="http://schemas.microsoft.com/office/infopath/2007/PartnerControls">
+  <documentManagement/>
+</p:properties>
 </file>
 
 <file path=customXml/itemProps1.xml><?xml version="1.0" encoding="utf-8"?>
@@ -6818,18 +6818,18 @@
 </file>
 
 <file path=customXml/itemProps2.xml><?xml version="1.0" encoding="utf-8"?>
+<ds:datastoreItem xmlns:ds="http://schemas.openxmlformats.org/officeDocument/2006/customXml" ds:itemID="{703D70BE-6769-44A8-BEFF-67F10EC2FF99}">
+  <ds:schemaRefs>
+    <ds:schemaRef ds:uri="http://schemas.microsoft.com/sharepoint/v3/contenttype/forms"/>
+  </ds:schemaRefs>
+</ds:datastoreItem>
+</file>
+
+<file path=customXml/itemProps3.xml><?xml version="1.0" encoding="utf-8"?>
 <ds:datastoreItem xmlns:ds="http://schemas.openxmlformats.org/officeDocument/2006/customXml" ds:itemID="{077774E8-F775-4602-B1E0-1FE6C8DEEA49}">
   <ds:schemaRefs>
     <ds:schemaRef ds:uri="http://schemas.microsoft.com/office/2006/metadata/properties"/>
     <ds:schemaRef ds:uri="http://schemas.microsoft.com/office/infopath/2007/PartnerControls"/>
   </ds:schemaRefs>
 </ds:datastoreItem>
-</file>
-
-<file path=customXml/itemProps3.xml><?xml version="1.0" encoding="utf-8"?>
-<ds:datastoreItem xmlns:ds="http://schemas.openxmlformats.org/officeDocument/2006/customXml" ds:itemID="{703D70BE-6769-44A8-BEFF-67F10EC2FF99}">
-  <ds:schemaRefs>
-    <ds:schemaRef ds:uri="http://schemas.microsoft.com/sharepoint/v3/contenttype/forms"/>
-  </ds:schemaRefs>
-</ds:datastoreItem>
 </file>
</xml_diff>